<commit_message>
ppt xq part final
</commit_message>
<xml_diff>
--- a/MLAI mini project.pptx
+++ b/MLAI mini project.pptx
@@ -33,8 +33,7 @@
     <p:sldId id="286" r:id="rId27"/>
     <p:sldId id="287" r:id="rId28"/>
     <p:sldId id="288" r:id="rId29"/>
-    <p:sldId id="290" r:id="rId30"/>
-    <p:sldId id="257" r:id="rId31"/>
+    <p:sldId id="257" r:id="rId30"/>
   </p:sldIdLst>
   <p:sldSz cx="12192000" cy="6858000"/>
   <p:notesSz cx="6858000" cy="9144000"/>
@@ -290,7 +289,7 @@
           <a:p>
             <a:fld id="{A2872D0C-785B-4C85-98CF-0770683F3808}" type="datetimeFigureOut">
               <a:rPr lang="en-SG" smtClean="0"/>
-              <a:t>2/7/2021</a:t>
+              <a:t>3/7/2021</a:t>
             </a:fld>
             <a:endParaRPr lang="en-SG"/>
           </a:p>
@@ -490,7 +489,7 @@
           <a:p>
             <a:fld id="{A2872D0C-785B-4C85-98CF-0770683F3808}" type="datetimeFigureOut">
               <a:rPr lang="en-SG" smtClean="0"/>
-              <a:t>2/7/2021</a:t>
+              <a:t>3/7/2021</a:t>
             </a:fld>
             <a:endParaRPr lang="en-SG"/>
           </a:p>
@@ -700,7 +699,7 @@
           <a:p>
             <a:fld id="{A2872D0C-785B-4C85-98CF-0770683F3808}" type="datetimeFigureOut">
               <a:rPr lang="en-SG" smtClean="0"/>
-              <a:t>2/7/2021</a:t>
+              <a:t>3/7/2021</a:t>
             </a:fld>
             <a:endParaRPr lang="en-SG"/>
           </a:p>
@@ -900,7 +899,7 @@
           <a:p>
             <a:fld id="{A2872D0C-785B-4C85-98CF-0770683F3808}" type="datetimeFigureOut">
               <a:rPr lang="en-SG" smtClean="0"/>
-              <a:t>2/7/2021</a:t>
+              <a:t>3/7/2021</a:t>
             </a:fld>
             <a:endParaRPr lang="en-SG"/>
           </a:p>
@@ -1176,7 +1175,7 @@
           <a:p>
             <a:fld id="{A2872D0C-785B-4C85-98CF-0770683F3808}" type="datetimeFigureOut">
               <a:rPr lang="en-SG" smtClean="0"/>
-              <a:t>2/7/2021</a:t>
+              <a:t>3/7/2021</a:t>
             </a:fld>
             <a:endParaRPr lang="en-SG"/>
           </a:p>
@@ -1444,7 +1443,7 @@
           <a:p>
             <a:fld id="{A2872D0C-785B-4C85-98CF-0770683F3808}" type="datetimeFigureOut">
               <a:rPr lang="en-SG" smtClean="0"/>
-              <a:t>2/7/2021</a:t>
+              <a:t>3/7/2021</a:t>
             </a:fld>
             <a:endParaRPr lang="en-SG"/>
           </a:p>
@@ -1859,7 +1858,7 @@
           <a:p>
             <a:fld id="{A2872D0C-785B-4C85-98CF-0770683F3808}" type="datetimeFigureOut">
               <a:rPr lang="en-SG" smtClean="0"/>
-              <a:t>2/7/2021</a:t>
+              <a:t>3/7/2021</a:t>
             </a:fld>
             <a:endParaRPr lang="en-SG"/>
           </a:p>
@@ -2001,7 +2000,7 @@
           <a:p>
             <a:fld id="{A2872D0C-785B-4C85-98CF-0770683F3808}" type="datetimeFigureOut">
               <a:rPr lang="en-SG" smtClean="0"/>
-              <a:t>2/7/2021</a:t>
+              <a:t>3/7/2021</a:t>
             </a:fld>
             <a:endParaRPr lang="en-SG"/>
           </a:p>
@@ -2114,7 +2113,7 @@
           <a:p>
             <a:fld id="{A2872D0C-785B-4C85-98CF-0770683F3808}" type="datetimeFigureOut">
               <a:rPr lang="en-SG" smtClean="0"/>
-              <a:t>2/7/2021</a:t>
+              <a:t>3/7/2021</a:t>
             </a:fld>
             <a:endParaRPr lang="en-SG"/>
           </a:p>
@@ -2427,7 +2426,7 @@
           <a:p>
             <a:fld id="{A2872D0C-785B-4C85-98CF-0770683F3808}" type="datetimeFigureOut">
               <a:rPr lang="en-SG" smtClean="0"/>
-              <a:t>2/7/2021</a:t>
+              <a:t>3/7/2021</a:t>
             </a:fld>
             <a:endParaRPr lang="en-SG"/>
           </a:p>
@@ -2716,7 +2715,7 @@
           <a:p>
             <a:fld id="{A2872D0C-785B-4C85-98CF-0770683F3808}" type="datetimeFigureOut">
               <a:rPr lang="en-SG" smtClean="0"/>
-              <a:t>2/7/2021</a:t>
+              <a:t>3/7/2021</a:t>
             </a:fld>
             <a:endParaRPr lang="en-SG"/>
           </a:p>
@@ -2959,7 +2958,7 @@
           <a:p>
             <a:fld id="{A2872D0C-785B-4C85-98CF-0770683F3808}" type="datetimeFigureOut">
               <a:rPr lang="en-SG" smtClean="0"/>
-              <a:t>2/7/2021</a:t>
+              <a:t>3/7/2021</a:t>
             </a:fld>
             <a:endParaRPr lang="en-SG"/>
           </a:p>
@@ -5906,7 +5905,7 @@
           <a:p>
             <a:r>
               <a:rPr lang="en-SG" dirty="0"/>
-              <a:t>Predicts 4 most of the time</a:t>
+              <a:t>Predicts correctly 4 most of the time</a:t>
             </a:r>
           </a:p>
           <a:p>
@@ -5915,7 +5914,7 @@
           <a:p>
             <a:r>
               <a:rPr lang="en-SG" dirty="0"/>
-              <a:t>Rarely predicts 5</a:t>
+              <a:t>Rarely predicts 5 correctly</a:t>
             </a:r>
           </a:p>
           <a:p>
@@ -6683,7 +6682,7 @@
                                       <p:cBhvr>
                                         <p:cTn id="6" dur="500"/>
                                         <p:tgtEl>
-                                          <p:spTgt spid="3"/>
+                                          <p:spTgt spid="4"/>
                                         </p:tgtEl>
                                       </p:cBhvr>
                                     </p:animEffect>
@@ -6695,7 +6694,7 @@
                                           </p:stCondLst>
                                         </p:cTn>
                                         <p:tgtEl>
-                                          <p:spTgt spid="3"/>
+                                          <p:spTgt spid="4"/>
                                         </p:tgtEl>
                                         <p:attrNameLst>
                                           <p:attrName>style.visibility</p:attrName>
@@ -6740,7 +6739,7 @@
                                           </p:stCondLst>
                                         </p:cTn>
                                         <p:tgtEl>
-                                          <p:spTgt spid="4"/>
+                                          <p:spTgt spid="3"/>
                                         </p:tgtEl>
                                         <p:attrNameLst>
                                           <p:attrName>style.visibility</p:attrName>
@@ -6754,7 +6753,7 @@
                                       <p:cBhvr>
                                         <p:cTn id="12" dur="500"/>
                                         <p:tgtEl>
-                                          <p:spTgt spid="4"/>
+                                          <p:spTgt spid="3"/>
                                         </p:tgtEl>
                                       </p:cBhvr>
                                     </p:animEffect>
@@ -6917,7 +6916,7 @@
           <a:p>
             <a:r>
               <a:rPr lang="en-SG" dirty="0"/>
-              <a:t>Rarely predicts 3</a:t>
+              <a:t>Rarely predicts 3 correctly</a:t>
             </a:r>
           </a:p>
         </p:txBody>
@@ -7650,11 +7649,11 @@
   <p:clrMapOvr>
     <a:masterClrMapping/>
   </p:clrMapOvr>
-  <mc:AlternateContent xmlns:mc="http://schemas.openxmlformats.org/markup-compatibility/2006">
-    <mc:Choice xmlns:p14="http://schemas.microsoft.com/office/powerpoint/2010/main" Requires="p14">
+  <mc:AlternateContent xmlns:mc="http://schemas.openxmlformats.org/markup-compatibility/2006" xmlns:p14="http://schemas.microsoft.com/office/powerpoint/2010/main">
+    <mc:Choice Requires="p14">
       <p:transition p14:dur="10"/>
     </mc:Choice>
-    <mc:Fallback>
+    <mc:Fallback xmlns="">
       <p:transition/>
     </mc:Fallback>
   </mc:AlternateContent>
@@ -7688,7 +7687,7 @@
                                       <p:cBhvr>
                                         <p:cTn id="6" dur="500"/>
                                         <p:tgtEl>
-                                          <p:spTgt spid="3"/>
+                                          <p:spTgt spid="6"/>
                                         </p:tgtEl>
                                       </p:cBhvr>
                                     </p:animEffect>
@@ -7700,7 +7699,7 @@
                                           </p:stCondLst>
                                         </p:cTn>
                                         <p:tgtEl>
-                                          <p:spTgt spid="3"/>
+                                          <p:spTgt spid="6"/>
                                         </p:tgtEl>
                                         <p:attrNameLst>
                                           <p:attrName>style.visibility</p:attrName>
@@ -7732,7 +7731,7 @@
                             </p:stCondLst>
                             <p:childTnLst>
                               <p:par>
-                                <p:cTn id="10" presetID="1" presetClass="entr" presetSubtype="0" fill="hold" grpId="0" nodeType="clickEffect">
+                                <p:cTn id="10" presetID="10" presetClass="entr" presetSubtype="0" fill="hold" grpId="0" nodeType="clickEffect">
                                   <p:stCondLst>
                                     <p:cond delay="0"/>
                                   </p:stCondLst>
@@ -7745,7 +7744,7 @@
                                           </p:stCondLst>
                                         </p:cTn>
                                         <p:tgtEl>
-                                          <p:spTgt spid="6"/>
+                                          <p:spTgt spid="3"/>
                                         </p:tgtEl>
                                         <p:attrNameLst>
                                           <p:attrName>style.visibility</p:attrName>
@@ -7755,6 +7754,14 @@
                                         <p:strVal val="visible"/>
                                       </p:to>
                                     </p:set>
+                                    <p:animEffect transition="in" filter="fade">
+                                      <p:cBhvr>
+                                        <p:cTn id="12" dur="500"/>
+                                        <p:tgtEl>
+                                          <p:spTgt spid="3"/>
+                                        </p:tgtEl>
+                                      </p:cBhvr>
+                                    </p:animEffect>
                                   </p:childTnLst>
                                 </p:cTn>
                               </p:par>
@@ -7897,8 +7904,35 @@
               <a:buNone/>
             </a:pPr>
             <a:r>
+              <a:rPr lang="en-US" dirty="0">
+                <a:hlinkClick r:id="rId2"/>
+              </a:rPr>
+              <a:t>https://www.anaconda.com/products/individual</a:t>
+            </a:r>
+            <a:endParaRPr lang="en-US" dirty="0"/>
+          </a:p>
+          <a:p>
+            <a:pPr marL="0" indent="0">
+              <a:buNone/>
+            </a:pPr>
+            <a:endParaRPr lang="en-US" dirty="0"/>
+          </a:p>
+          <a:p>
+            <a:pPr marL="0" indent="0">
+              <a:buNone/>
+            </a:pPr>
+            <a:r>
               <a:rPr lang="en-US" dirty="0"/>
-              <a:t>https://www.anaconda.com/products/individual</a:t>
+              <a:t>Download and install Python 3 installed on your PC for batch files </a:t>
+            </a:r>
+          </a:p>
+          <a:p>
+            <a:pPr marL="0" indent="0">
+              <a:buNone/>
+            </a:pPr>
+            <a:r>
+              <a:rPr lang="en-US" dirty="0"/>
+              <a:t>https://ninite.com/pythonx3/</a:t>
             </a:r>
             <a:endParaRPr lang="en-SG" dirty="0"/>
           </a:p>
@@ -9219,7 +9253,7 @@
           <p:cNvPr id="2" name="Title 1">
             <a:extLst>
               <a:ext uri="{FF2B5EF4-FFF2-40B4-BE49-F238E27FC236}">
-                <a16:creationId xmlns:a16="http://schemas.microsoft.com/office/drawing/2014/main" id="{95CB708C-FA02-4C03-91E6-0DA00A2B9C5B}"/>
+                <a16:creationId xmlns:a16="http://schemas.microsoft.com/office/drawing/2014/main" id="{2C94E3B1-9A8C-4491-A9A6-755ACB062CF4}"/>
               </a:ext>
             </a:extLst>
           </p:cNvPr>
@@ -9235,7 +9269,10 @@
           <a:bodyPr/>
           <a:lstStyle/>
           <a:p>
-            <a:endParaRPr lang="en-SG"/>
+            <a:r>
+              <a:rPr lang="en-SG" dirty="0"/>
+              <a:t>Data Preparation</a:t>
+            </a:r>
           </a:p>
         </p:txBody>
       </p:sp>
@@ -9244,7 +9281,7 @@
           <p:cNvPr id="3" name="Content Placeholder 2">
             <a:extLst>
               <a:ext uri="{FF2B5EF4-FFF2-40B4-BE49-F238E27FC236}">
-                <a16:creationId xmlns:a16="http://schemas.microsoft.com/office/drawing/2014/main" id="{1025D5FB-25B7-4D9D-99BC-F4C415FD2335}"/>
+                <a16:creationId xmlns:a16="http://schemas.microsoft.com/office/drawing/2014/main" id="{D3224137-5A20-45F0-8584-7EABF3EAA354}"/>
               </a:ext>
             </a:extLst>
           </p:cNvPr>
@@ -9260,14 +9297,28 @@
           <a:bodyPr/>
           <a:lstStyle/>
           <a:p>
-            <a:endParaRPr lang="en-SG"/>
+            <a:pPr marL="0" indent="0">
+              <a:buNone/>
+            </a:pPr>
+            <a:r>
+              <a:rPr lang="en-SG" dirty="0"/>
+              <a:t>Collecting band new images can be difficult and </a:t>
+            </a:r>
+            <a:r>
+              <a:rPr lang="en-SG" dirty="0" err="1"/>
+              <a:t>labourous</a:t>
+            </a:r>
+            <a:r>
+              <a:rPr lang="en-SG" dirty="0"/>
+              <a:t>, thus some images from RPS dataset was reused to speed up the process. Because someone was supposed to do it but preferred to go hang out and get drunk and when the data is sent over it isn’t 1:1 ratio</a:t>
+            </a:r>
           </a:p>
         </p:txBody>
       </p:sp>
     </p:spTree>
     <p:extLst>
       <p:ext uri="{BB962C8B-B14F-4D97-AF65-F5344CB8AC3E}">
-        <p14:creationId xmlns:p14="http://schemas.microsoft.com/office/powerpoint/2010/main" val="2886363378"/>
+        <p14:creationId xmlns:p14="http://schemas.microsoft.com/office/powerpoint/2010/main" val="2520431078"/>
       </p:ext>
     </p:extLst>
   </p:cSld>
@@ -9357,103 +9408,6 @@
     <p:extLst>
       <p:ext uri="{BB962C8B-B14F-4D97-AF65-F5344CB8AC3E}">
         <p14:creationId xmlns:p14="http://schemas.microsoft.com/office/powerpoint/2010/main" val="1141297453"/>
-      </p:ext>
-    </p:extLst>
-  </p:cSld>
-  <p:clrMapOvr>
-    <a:masterClrMapping/>
-  </p:clrMapOvr>
-</p:sld>
-</file>
-
-<file path=ppt/slides/slide30.xml><?xml version="1.0" encoding="utf-8"?>
-<p:sld xmlns:a="http://schemas.openxmlformats.org/drawingml/2006/main" xmlns:r="http://schemas.openxmlformats.org/officeDocument/2006/relationships" xmlns:p="http://schemas.openxmlformats.org/presentationml/2006/main">
-  <p:cSld>
-    <p:spTree>
-      <p:nvGrpSpPr>
-        <p:cNvPr id="1" name=""/>
-        <p:cNvGrpSpPr/>
-        <p:nvPr/>
-      </p:nvGrpSpPr>
-      <p:grpSpPr>
-        <a:xfrm>
-          <a:off x="0" y="0"/>
-          <a:ext cx="0" cy="0"/>
-          <a:chOff x="0" y="0"/>
-          <a:chExt cx="0" cy="0"/>
-        </a:xfrm>
-      </p:grpSpPr>
-      <p:sp>
-        <p:nvSpPr>
-          <p:cNvPr id="2" name="Title 1">
-            <a:extLst>
-              <a:ext uri="{FF2B5EF4-FFF2-40B4-BE49-F238E27FC236}">
-                <a16:creationId xmlns:a16="http://schemas.microsoft.com/office/drawing/2014/main" id="{2C94E3B1-9A8C-4491-A9A6-755ACB062CF4}"/>
-              </a:ext>
-            </a:extLst>
-          </p:cNvPr>
-          <p:cNvSpPr>
-            <a:spLocks noGrp="1"/>
-          </p:cNvSpPr>
-          <p:nvPr>
-            <p:ph type="title"/>
-          </p:nvPr>
-        </p:nvSpPr>
-        <p:spPr/>
-        <p:txBody>
-          <a:bodyPr/>
-          <a:lstStyle/>
-          <a:p>
-            <a:r>
-              <a:rPr lang="en-SG" dirty="0"/>
-              <a:t>Data Preparation</a:t>
-            </a:r>
-          </a:p>
-        </p:txBody>
-      </p:sp>
-      <p:sp>
-        <p:nvSpPr>
-          <p:cNvPr id="3" name="Content Placeholder 2">
-            <a:extLst>
-              <a:ext uri="{FF2B5EF4-FFF2-40B4-BE49-F238E27FC236}">
-                <a16:creationId xmlns:a16="http://schemas.microsoft.com/office/drawing/2014/main" id="{D3224137-5A20-45F0-8584-7EABF3EAA354}"/>
-              </a:ext>
-            </a:extLst>
-          </p:cNvPr>
-          <p:cNvSpPr>
-            <a:spLocks noGrp="1"/>
-          </p:cNvSpPr>
-          <p:nvPr>
-            <p:ph idx="1"/>
-          </p:nvPr>
-        </p:nvSpPr>
-        <p:spPr/>
-        <p:txBody>
-          <a:bodyPr/>
-          <a:lstStyle/>
-          <a:p>
-            <a:pPr marL="0" indent="0">
-              <a:buNone/>
-            </a:pPr>
-            <a:r>
-              <a:rPr lang="en-SG" dirty="0"/>
-              <a:t>Collecting band new images can be difficult and </a:t>
-            </a:r>
-            <a:r>
-              <a:rPr lang="en-SG" dirty="0" err="1"/>
-              <a:t>labourous</a:t>
-            </a:r>
-            <a:r>
-              <a:rPr lang="en-SG" dirty="0"/>
-              <a:t>, thus some images from RPS dataset was reused to speed up the process. Because someone was supposed to do it but preferred to go hang out and get drunk and when the data is sent over it isn’t 1:1 ratio</a:t>
-            </a:r>
-          </a:p>
-        </p:txBody>
-      </p:sp>
-    </p:spTree>
-    <p:extLst>
-      <p:ext uri="{BB962C8B-B14F-4D97-AF65-F5344CB8AC3E}">
-        <p14:creationId xmlns:p14="http://schemas.microsoft.com/office/powerpoint/2010/main" val="2520431078"/>
       </p:ext>
     </p:extLst>
   </p:cSld>

</xml_diff>